<commit_message>
edited visuals for poster
</commit_message>
<xml_diff>
--- a/Reports/STLDataFest_Poster.pptx
+++ b/Reports/STLDataFest_Poster.pptx
@@ -115,6 +115,12 @@
 </p:presentation>
 </file>
 
+<file path=ppt/authors.xml><?xml version="1.0" encoding="utf-8"?>
+<p188:authorLst xmlns:a="http://schemas.openxmlformats.org/drawingml/2006/main" xmlns:r="http://schemas.openxmlformats.org/officeDocument/2006/relationships" xmlns:p188="http://schemas.microsoft.com/office/powerpoint/2018/8/main">
+  <p188:author id="{D389BB9A-0491-EBF4-5804-F66E4B4C89F8}" name="Osweiler, Bailey" initials="" userId="S::b.osweiler@wustl.edu::c138bfc2-52f0-490c-91de-cfb231920a58" providerId="AD"/>
+</p188:authorLst>
+</file>
+
 <file path=ppt/notesMasters/notesMaster1.xml><?xml version="1.0" encoding="utf-8"?>
 <p:notesMaster xmlns:a="http://schemas.openxmlformats.org/drawingml/2006/main" xmlns:r="http://schemas.openxmlformats.org/officeDocument/2006/relationships" xmlns:p="http://schemas.openxmlformats.org/presentationml/2006/main">
   <p:cSld>
@@ -197,7 +203,7 @@
           <a:p>
             <a:fld id="{10ECB67A-B9A8-D249-A51A-D5291EFC911A}" type="datetimeFigureOut">
               <a:rPr lang="en-US" smtClean="0"/>
-              <a:t>5/7/24</a:t>
+              <a:t>5/13/24</a:t>
             </a:fld>
             <a:endParaRPr lang="en-US"/>
           </a:p>
@@ -684,7 +690,7 @@
           <a:p>
             <a:fld id="{FECAD6F6-D761-0143-B6E9-66D3CD475255}" type="datetimeFigureOut">
               <a:rPr lang="en-US" smtClean="0"/>
-              <a:t>5/7/24</a:t>
+              <a:t>5/13/24</a:t>
             </a:fld>
             <a:endParaRPr lang="en-US"/>
           </a:p>
@@ -854,7 +860,7 @@
           <a:p>
             <a:fld id="{FECAD6F6-D761-0143-B6E9-66D3CD475255}" type="datetimeFigureOut">
               <a:rPr lang="en-US" smtClean="0"/>
-              <a:t>5/7/24</a:t>
+              <a:t>5/13/24</a:t>
             </a:fld>
             <a:endParaRPr lang="en-US"/>
           </a:p>
@@ -1034,7 +1040,7 @@
           <a:p>
             <a:fld id="{FECAD6F6-D761-0143-B6E9-66D3CD475255}" type="datetimeFigureOut">
               <a:rPr lang="en-US" smtClean="0"/>
-              <a:t>5/7/24</a:t>
+              <a:t>5/13/24</a:t>
             </a:fld>
             <a:endParaRPr lang="en-US"/>
           </a:p>
@@ -1204,7 +1210,7 @@
           <a:p>
             <a:fld id="{FECAD6F6-D761-0143-B6E9-66D3CD475255}" type="datetimeFigureOut">
               <a:rPr lang="en-US" smtClean="0"/>
-              <a:t>5/7/24</a:t>
+              <a:t>5/13/24</a:t>
             </a:fld>
             <a:endParaRPr lang="en-US"/>
           </a:p>
@@ -1448,7 +1454,7 @@
           <a:p>
             <a:fld id="{FECAD6F6-D761-0143-B6E9-66D3CD475255}" type="datetimeFigureOut">
               <a:rPr lang="en-US" smtClean="0"/>
-              <a:t>5/7/24</a:t>
+              <a:t>5/13/24</a:t>
             </a:fld>
             <a:endParaRPr lang="en-US"/>
           </a:p>
@@ -1680,7 +1686,7 @@
           <a:p>
             <a:fld id="{FECAD6F6-D761-0143-B6E9-66D3CD475255}" type="datetimeFigureOut">
               <a:rPr lang="en-US" smtClean="0"/>
-              <a:t>5/7/24</a:t>
+              <a:t>5/13/24</a:t>
             </a:fld>
             <a:endParaRPr lang="en-US"/>
           </a:p>
@@ -2047,7 +2053,7 @@
           <a:p>
             <a:fld id="{FECAD6F6-D761-0143-B6E9-66D3CD475255}" type="datetimeFigureOut">
               <a:rPr lang="en-US" smtClean="0"/>
-              <a:t>5/7/24</a:t>
+              <a:t>5/13/24</a:t>
             </a:fld>
             <a:endParaRPr lang="en-US"/>
           </a:p>
@@ -2165,7 +2171,7 @@
           <a:p>
             <a:fld id="{FECAD6F6-D761-0143-B6E9-66D3CD475255}" type="datetimeFigureOut">
               <a:rPr lang="en-US" smtClean="0"/>
-              <a:t>5/7/24</a:t>
+              <a:t>5/13/24</a:t>
             </a:fld>
             <a:endParaRPr lang="en-US"/>
           </a:p>
@@ -2260,7 +2266,7 @@
           <a:p>
             <a:fld id="{FECAD6F6-D761-0143-B6E9-66D3CD475255}" type="datetimeFigureOut">
               <a:rPr lang="en-US" smtClean="0"/>
-              <a:t>5/7/24</a:t>
+              <a:t>5/13/24</a:t>
             </a:fld>
             <a:endParaRPr lang="en-US"/>
           </a:p>
@@ -2537,7 +2543,7 @@
           <a:p>
             <a:fld id="{FECAD6F6-D761-0143-B6E9-66D3CD475255}" type="datetimeFigureOut">
               <a:rPr lang="en-US" smtClean="0"/>
-              <a:t>5/7/24</a:t>
+              <a:t>5/13/24</a:t>
             </a:fld>
             <a:endParaRPr lang="en-US"/>
           </a:p>
@@ -2794,7 +2800,7 @@
           <a:p>
             <a:fld id="{FECAD6F6-D761-0143-B6E9-66D3CD475255}" type="datetimeFigureOut">
               <a:rPr lang="en-US" smtClean="0"/>
-              <a:t>5/7/24</a:t>
+              <a:t>5/13/24</a:t>
             </a:fld>
             <a:endParaRPr lang="en-US"/>
           </a:p>
@@ -3007,7 +3013,7 @@
           <a:p>
             <a:fld id="{FECAD6F6-D761-0143-B6E9-66D3CD475255}" type="datetimeFigureOut">
               <a:rPr lang="en-US" smtClean="0"/>
-              <a:t>5/7/24</a:t>
+              <a:t>5/13/24</a:t>
             </a:fld>
             <a:endParaRPr lang="en-US"/>
           </a:p>
@@ -3447,8 +3453,8 @@
         </p:blipFill>
         <p:spPr>
           <a:xfrm>
-            <a:off x="21313812" y="4926773"/>
-            <a:ext cx="10327276" cy="6731054"/>
+            <a:off x="20997944" y="4954092"/>
+            <a:ext cx="10781033" cy="7026801"/>
           </a:xfrm>
           <a:prstGeom prst="rect">
             <a:avLst/>
@@ -3522,7 +3528,7 @@
         <p:spPr>
           <a:xfrm>
             <a:off x="1135055" y="662244"/>
-            <a:ext cx="24943633" cy="1754326"/>
+            <a:ext cx="24943633" cy="1631216"/>
           </a:xfrm>
           <a:prstGeom prst="rect">
             <a:avLst/>
@@ -3536,7 +3542,7 @@
           <a:lstStyle/>
           <a:p>
             <a:r>
-              <a:rPr lang="en-US" sz="5400" b="1" dirty="0">
+              <a:rPr lang="en-US" sz="5000" b="1" dirty="0">
                 <a:solidFill>
                   <a:schemeClr val="bg1"/>
                 </a:solidFill>
@@ -3593,8 +3599,8 @@
         </p:nvSpPr>
         <p:spPr>
           <a:xfrm>
-            <a:off x="578030" y="3825847"/>
-            <a:ext cx="10346237" cy="7761084"/>
+            <a:off x="578031" y="3825847"/>
+            <a:ext cx="10055964" cy="7761084"/>
           </a:xfrm>
           <a:prstGeom prst="rect">
             <a:avLst/>
@@ -3643,28 +3649,18 @@
                 <a:solidFill>
                   <a:schemeClr val="tx1"/>
                 </a:solidFill>
-                <a:effectLst/>
                 <a:latin typeface="Source Sans Pro" panose="020B0503030403020204" pitchFamily="34" charset="0"/>
                 <a:ea typeface="Source Sans Pro" panose="020B0503030403020204" pitchFamily="34" charset="0"/>
                 <a:cs typeface="Times New Roman" panose="02020603050405020304" pitchFamily="18" charset="0"/>
               </a:rPr>
-              <a:t>The United States is in a drug overdose crisis, with drug fatalities increasing steadily this century. With the rise in overdose deaths, substance use disorders (SUDs) are more recognized and new treatment centers are emerging across the country. This study aims to reveal whether the number of SUD treatment centers may be a market response to demand for treatment centers (as measured by substance use rates) in the United States from 2014 – 2019.</a:t>
-            </a:r>
-          </a:p>
-          <a:p>
-            <a:pPr algn="ctr"/>
-            <a:endParaRPr lang="en-US" sz="3200" kern="100" dirty="0">
-              <a:solidFill>
-                <a:schemeClr val="tx1"/>
-              </a:solidFill>
-              <a:effectLst/>
-              <a:latin typeface="Source Sans Pro" panose="020B0503030403020204" pitchFamily="34" charset="0"/>
-              <a:ea typeface="Source Sans Pro" panose="020B0503030403020204" pitchFamily="34" charset="0"/>
-              <a:cs typeface="Times New Roman" panose="02020603050405020304" pitchFamily="18" charset="0"/>
-            </a:endParaRPr>
-          </a:p>
-          <a:p>
-            <a:pPr algn="ctr"/>
+              <a:t>Two important events coincided in 2013:</a:t>
+            </a:r>
+          </a:p>
+          <a:p>
+            <a:pPr marL="457200" indent="-457200">
+              <a:buFont typeface="Arial" panose="020B0604020202020204" pitchFamily="34" charset="0"/>
+              <a:buChar char="•"/>
+            </a:pPr>
             <a:r>
               <a:rPr lang="en-US" sz="3200" kern="100" dirty="0">
                 <a:solidFill>
@@ -3675,7 +3671,140 @@
                 <a:ea typeface="Source Sans Pro" panose="020B0503030403020204" pitchFamily="34" charset="0"/>
                 <a:cs typeface="Times New Roman" panose="02020603050405020304" pitchFamily="18" charset="0"/>
               </a:rPr>
-              <a:t>The study used several publicly available data sources from the U.S. Substance Abuse and Mental Health Services Administration (SAMHSA). </a:t>
+              <a:t>The Affordable Care </a:t>
+            </a:r>
+            <a:r>
+              <a:rPr lang="en-US" sz="3200" kern="100" dirty="0">
+                <a:solidFill>
+                  <a:schemeClr val="tx1"/>
+                </a:solidFill>
+                <a:latin typeface="Source Sans Pro" panose="020B0503030403020204" pitchFamily="34" charset="0"/>
+                <a:ea typeface="Source Sans Pro" panose="020B0503030403020204" pitchFamily="34" charset="0"/>
+                <a:cs typeface="Times New Roman" panose="02020603050405020304" pitchFamily="18" charset="0"/>
+              </a:rPr>
+              <a:t>Act (ACA) increased insurance coverage of substance use disorders (SUD), and</a:t>
+            </a:r>
+          </a:p>
+          <a:p>
+            <a:pPr marL="457200" indent="-457200">
+              <a:buFont typeface="Arial" panose="020B0604020202020204" pitchFamily="34" charset="0"/>
+              <a:buChar char="•"/>
+            </a:pPr>
+            <a:r>
+              <a:rPr lang="en-US" sz="3200" kern="100" dirty="0">
+                <a:solidFill>
+                  <a:schemeClr val="tx1"/>
+                </a:solidFill>
+                <a:latin typeface="Source Sans Pro" panose="020B0503030403020204" pitchFamily="34" charset="0"/>
+                <a:ea typeface="Source Sans Pro" panose="020B0503030403020204" pitchFamily="34" charset="0"/>
+                <a:cs typeface="Times New Roman" panose="02020603050405020304" pitchFamily="18" charset="0"/>
+              </a:rPr>
+              <a:t>Overdose deaths skyrocketed, due largely to fentanyl </a:t>
+            </a:r>
+          </a:p>
+          <a:p>
+            <a:endParaRPr lang="en-US" sz="3200" kern="100" dirty="0">
+              <a:solidFill>
+                <a:schemeClr val="tx1"/>
+              </a:solidFill>
+              <a:latin typeface="Source Sans Pro" panose="020B0503030403020204" pitchFamily="34" charset="0"/>
+              <a:ea typeface="Source Sans Pro" panose="020B0503030403020204" pitchFamily="34" charset="0"/>
+              <a:cs typeface="Times New Roman" panose="02020603050405020304" pitchFamily="18" charset="0"/>
+            </a:endParaRPr>
+          </a:p>
+          <a:p>
+            <a:r>
+              <a:rPr lang="en-US" sz="3200" kern="100" dirty="0">
+                <a:solidFill>
+                  <a:schemeClr val="tx1"/>
+                </a:solidFill>
+                <a:latin typeface="Source Sans Pro" panose="020B0503030403020204" pitchFamily="34" charset="0"/>
+                <a:ea typeface="Source Sans Pro" panose="020B0503030403020204" pitchFamily="34" charset="0"/>
+                <a:cs typeface="Times New Roman" panose="02020603050405020304" pitchFamily="18" charset="0"/>
+              </a:rPr>
+              <a:t>Since then, new SUD treatment centers have emerged across the U.S. but face criticism for profit-driven motives. </a:t>
+            </a:r>
+            <a:r>
+              <a:rPr lang="en-US" sz="3200" kern="100" dirty="0">
+                <a:solidFill>
+                  <a:schemeClr val="tx1"/>
+                </a:solidFill>
+                <a:effectLst/>
+                <a:latin typeface="Source Sans Pro" panose="020B0503030403020204" pitchFamily="34" charset="0"/>
+                <a:ea typeface="Source Sans Pro" panose="020B0503030403020204" pitchFamily="34" charset="0"/>
+                <a:cs typeface="Times New Roman" panose="02020603050405020304" pitchFamily="18" charset="0"/>
+              </a:rPr>
+              <a:t>This study investigates </a:t>
+            </a:r>
+            <a:r>
+              <a:rPr lang="en-US" sz="3200" b="1" i="1" kern="100" dirty="0">
+                <a:solidFill>
+                  <a:schemeClr val="tx1"/>
+                </a:solidFill>
+                <a:effectLst/>
+                <a:latin typeface="Source Sans Pro" panose="020B0503030403020204" pitchFamily="34" charset="0"/>
+                <a:ea typeface="Source Sans Pro" panose="020B0503030403020204" pitchFamily="34" charset="0"/>
+                <a:cs typeface="Times New Roman" panose="02020603050405020304" pitchFamily="18" charset="0"/>
+              </a:rPr>
+              <a:t>whether the number of SUD treatment centers may be a market response</a:t>
+            </a:r>
+            <a:r>
+              <a:rPr lang="en-US" sz="3200" kern="100" dirty="0">
+                <a:solidFill>
+                  <a:schemeClr val="tx1"/>
+                </a:solidFill>
+                <a:effectLst/>
+                <a:latin typeface="Source Sans Pro" panose="020B0503030403020204" pitchFamily="34" charset="0"/>
+                <a:ea typeface="Source Sans Pro" panose="020B0503030403020204" pitchFamily="34" charset="0"/>
+                <a:cs typeface="Times New Roman" panose="02020603050405020304" pitchFamily="18" charset="0"/>
+              </a:rPr>
+              <a:t>.</a:t>
+            </a:r>
+            <a:r>
+              <a:rPr lang="en-US" sz="3200" kern="100" dirty="0">
+                <a:solidFill>
+                  <a:schemeClr val="tx1"/>
+                </a:solidFill>
+                <a:latin typeface="Source Sans Pro" panose="020B0503030403020204" pitchFamily="34" charset="0"/>
+                <a:ea typeface="Source Sans Pro" panose="020B0503030403020204" pitchFamily="34" charset="0"/>
+                <a:cs typeface="Times New Roman" panose="02020603050405020304" pitchFamily="18" charset="0"/>
+              </a:rPr>
+              <a:t> </a:t>
+            </a:r>
+            <a:r>
+              <a:rPr lang="en-US" sz="3200" kern="100" dirty="0">
+                <a:solidFill>
+                  <a:schemeClr val="tx1"/>
+                </a:solidFill>
+                <a:effectLst/>
+                <a:latin typeface="Source Sans Pro" panose="020B0503030403020204" pitchFamily="34" charset="0"/>
+                <a:ea typeface="Source Sans Pro" panose="020B0503030403020204" pitchFamily="34" charset="0"/>
+                <a:cs typeface="Times New Roman" panose="02020603050405020304" pitchFamily="18" charset="0"/>
+              </a:rPr>
+              <a:t>Publicly available data from the U.S. Substance Abuse and Mental Health Services Administration (SAMHSA) form a panel dataset of 50 states and D.C. </a:t>
+            </a:r>
+            <a:r>
+              <a:rPr lang="en-US" sz="3200" kern="100" dirty="0">
+                <a:solidFill>
+                  <a:schemeClr val="tx1"/>
+                </a:solidFill>
+                <a:latin typeface="Source Sans Pro" panose="020B0503030403020204" pitchFamily="34" charset="0"/>
+                <a:ea typeface="Source Sans Pro" panose="020B0503030403020204" pitchFamily="34" charset="0"/>
+                <a:cs typeface="Times New Roman" panose="02020603050405020304" pitchFamily="18" charset="0"/>
+              </a:rPr>
+              <a:t>over five</a:t>
+            </a:r>
+            <a:r>
+              <a:rPr lang="en-US" sz="3200" kern="100" dirty="0">
+                <a:solidFill>
+                  <a:schemeClr val="tx1"/>
+                </a:solidFill>
+                <a:effectLst/>
+                <a:latin typeface="Source Sans Pro" panose="020B0503030403020204" pitchFamily="34" charset="0"/>
+                <a:ea typeface="Source Sans Pro" panose="020B0503030403020204" pitchFamily="34" charset="0"/>
+                <a:cs typeface="Times New Roman" panose="02020603050405020304" pitchFamily="18" charset="0"/>
+              </a:rPr>
+              <a:t> years (n = 255). </a:t>
             </a:r>
           </a:p>
         </p:txBody>
@@ -3688,8 +3817,8 @@
         </p:nvSpPr>
         <p:spPr>
           <a:xfrm>
-            <a:off x="11300240" y="3825846"/>
-            <a:ext cx="10346237" cy="9066709"/>
+            <a:off x="10908357" y="3825847"/>
+            <a:ext cx="10781032" cy="8471355"/>
           </a:xfrm>
           <a:prstGeom prst="rect">
             <a:avLst/>
@@ -3757,7 +3886,7 @@
                 <a:ea typeface="Source Sans Pro" panose="020B0503030403020204" pitchFamily="34" charset="0"/>
                 <a:cs typeface="Times New Roman" panose="02020603050405020304" pitchFamily="18" charset="0"/>
               </a:rPr>
-              <a:t>SAMHSA’s National Survey on Drug Use and Health (NSDUH) surveys a sample of Americans about their experience with substances and mental health and aggregates to prevalence rates for two-year periods in states. Measures of interest were alcohol use disorder (AUD) </a:t>
+              <a:t>SAMHSA’s National Survey on Drug Use and Health (NSDUH) surveys Americans about substance use and aggregates to two-year periods in each state. Measures of interest were adults reporting alcohol use disorder (AUD) criteria </a:t>
             </a:r>
             <a:r>
               <a:rPr lang="en-US" sz="3200" kern="100" dirty="0">
@@ -3768,7 +3897,7 @@
                 <a:ea typeface="Source Sans Pro" panose="020B0503030403020204" pitchFamily="34" charset="0"/>
                 <a:cs typeface="Times New Roman" panose="02020603050405020304" pitchFamily="18" charset="0"/>
               </a:rPr>
-              <a:t>and illicit drug use (summed cocaine + heroin use) in each state-year.</a:t>
+              <a:t>and illicit drug use (cocaine + heroin) in each state-year.</a:t>
             </a:r>
             <a:endParaRPr lang="en-US" sz="3200" kern="100" dirty="0">
               <a:solidFill>
@@ -3812,7 +3941,7 @@
         </p:nvSpPr>
         <p:spPr>
           <a:xfrm>
-            <a:off x="11300239" y="17949209"/>
+            <a:off x="10908355" y="17949209"/>
             <a:ext cx="10346237" cy="3413760"/>
           </a:xfrm>
           <a:prstGeom prst="rect">
@@ -3861,8 +3990,8 @@
         </p:nvSpPr>
         <p:spPr>
           <a:xfrm>
-            <a:off x="21989362" y="11922147"/>
-            <a:ext cx="10351008" cy="7044982"/>
+            <a:off x="21989362" y="12524365"/>
+            <a:ext cx="10351008" cy="6442764"/>
           </a:xfrm>
           <a:prstGeom prst="rect">
             <a:avLst/>
@@ -3904,11 +4033,14 @@
                 <a:ea typeface="Source Sans Pro" panose="020B0503030403020204" pitchFamily="34" charset="0"/>
                 <a:cs typeface="Times New Roman" panose="02020603050405020304" pitchFamily="18" charset="0"/>
               </a:rPr>
-              <a:t>Implications:</a:t>
-            </a:r>
-          </a:p>
-          <a:p>
-            <a:pPr algn="ctr"/>
+              <a:t>Findings:</a:t>
+            </a:r>
+          </a:p>
+          <a:p>
+            <a:pPr marL="457200" indent="-457200">
+              <a:buFont typeface="Arial" panose="020B0604020202020204" pitchFamily="34" charset="0"/>
+              <a:buChar char="•"/>
+            </a:pPr>
             <a:r>
               <a:rPr lang="en-US" sz="3200" kern="100" dirty="0">
                 <a:solidFill>
@@ -3918,7 +4050,7 @@
                 <a:ea typeface="Source Sans Pro" panose="020B0503030403020204" pitchFamily="34" charset="0"/>
                 <a:cs typeface="Times New Roman" panose="02020603050405020304" pitchFamily="18" charset="0"/>
               </a:rPr>
-              <a:t>T</a:t>
+              <a:t>F</a:t>
             </a:r>
             <a:r>
               <a:rPr lang="en-US" sz="3200" kern="100" dirty="0">
@@ -3930,8 +4062,38 @@
                 <a:ea typeface="Source Sans Pro" panose="020B0503030403020204" pitchFamily="34" charset="0"/>
                 <a:cs typeface="Times New Roman" panose="02020603050405020304" pitchFamily="18" charset="0"/>
               </a:rPr>
-              <a:t>he relationship between substance use and for-profit, non-profit, and government SUD treatment center trends differ. </a:t>
-            </a:r>
+              <a:t>or-profit treatment center counts are </a:t>
+            </a:r>
+            <a:r>
+              <a:rPr lang="en-US" sz="3200" b="1" i="1" kern="100" dirty="0">
+                <a:solidFill>
+                  <a:schemeClr val="tx1"/>
+                </a:solidFill>
+                <a:effectLst/>
+                <a:latin typeface="Source Sans Pro" panose="020B0503030403020204" pitchFamily="34" charset="0"/>
+                <a:ea typeface="Source Sans Pro" panose="020B0503030403020204" pitchFamily="34" charset="0"/>
+                <a:cs typeface="Times New Roman" panose="02020603050405020304" pitchFamily="18" charset="0"/>
+              </a:rPr>
+              <a:t>positively associated with drug use</a:t>
+            </a:r>
+            <a:r>
+              <a:rPr lang="en-US" sz="3200" kern="100" dirty="0">
+                <a:solidFill>
+                  <a:schemeClr val="tx1"/>
+                </a:solidFill>
+                <a:effectLst/>
+                <a:latin typeface="Source Sans Pro" panose="020B0503030403020204" pitchFamily="34" charset="0"/>
+                <a:ea typeface="Source Sans Pro" panose="020B0503030403020204" pitchFamily="34" charset="0"/>
+                <a:cs typeface="Times New Roman" panose="02020603050405020304" pitchFamily="18" charset="0"/>
+              </a:rPr>
+              <a:t>, indicating a potential market response to the “demand” of drug use post-ACA. </a:t>
+            </a:r>
+          </a:p>
+          <a:p>
+            <a:pPr marL="457200" indent="-457200">
+              <a:buFont typeface="Arial" panose="020B0604020202020204" pitchFamily="34" charset="0"/>
+              <a:buChar char="•"/>
+            </a:pPr>
             <a:r>
               <a:rPr lang="en-US" sz="3200" kern="100" dirty="0">
                 <a:solidFill>
@@ -3953,7 +4115,30 @@
                 <a:ea typeface="Source Sans Pro" panose="020B0503030403020204" pitchFamily="34" charset="0"/>
                 <a:cs typeface="Times New Roman" panose="02020603050405020304" pitchFamily="18" charset="0"/>
               </a:rPr>
-              <a:t>or-profit treatment center counts are associated with drug use after controlling for population, indicating a potential market response to the “demand” of drug use. However, for-profits’ relationship </a:t>
+              <a:t>or-profit treatment center counts are </a:t>
+            </a:r>
+            <a:r>
+              <a:rPr lang="en-US" sz="3200" b="1" i="1" kern="100" dirty="0">
+                <a:solidFill>
+                  <a:schemeClr val="tx1"/>
+                </a:solidFill>
+                <a:effectLst/>
+                <a:latin typeface="Source Sans Pro" panose="020B0503030403020204" pitchFamily="34" charset="0"/>
+                <a:ea typeface="Source Sans Pro" panose="020B0503030403020204" pitchFamily="34" charset="0"/>
+                <a:cs typeface="Times New Roman" panose="02020603050405020304" pitchFamily="18" charset="0"/>
+              </a:rPr>
+              <a:t>negatively associated </a:t>
+            </a:r>
+            <a:r>
+              <a:rPr lang="en-US" sz="3200" b="1" i="1" kern="100" dirty="0">
+                <a:solidFill>
+                  <a:schemeClr val="tx1"/>
+                </a:solidFill>
+                <a:latin typeface="Source Sans Pro" panose="020B0503030403020204" pitchFamily="34" charset="0"/>
+                <a:ea typeface="Source Sans Pro" panose="020B0503030403020204" pitchFamily="34" charset="0"/>
+                <a:cs typeface="Times New Roman" panose="02020603050405020304" pitchFamily="18" charset="0"/>
+              </a:rPr>
+              <a:t>with AUD</a:t>
             </a:r>
             <a:r>
               <a:rPr lang="en-US" sz="3200" kern="100" dirty="0">
@@ -3964,31 +4149,14 @@
                 <a:ea typeface="Source Sans Pro" panose="020B0503030403020204" pitchFamily="34" charset="0"/>
                 <a:cs typeface="Times New Roman" panose="02020603050405020304" pitchFamily="18" charset="0"/>
               </a:rPr>
-              <a:t>with AUD is negative, which does not suggest that this uptick is a response to AUD.</a:t>
-            </a:r>
-            <a:endParaRPr lang="en-US" sz="3200" kern="100" dirty="0">
-              <a:solidFill>
-                <a:schemeClr val="tx1"/>
-              </a:solidFill>
-              <a:effectLst/>
-              <a:latin typeface="Source Sans Pro" panose="020B0503030403020204" pitchFamily="34" charset="0"/>
-              <a:ea typeface="Source Sans Pro" panose="020B0503030403020204" pitchFamily="34" charset="0"/>
-              <a:cs typeface="Times New Roman" panose="02020603050405020304" pitchFamily="18" charset="0"/>
-            </a:endParaRPr>
-          </a:p>
-          <a:p>
-            <a:pPr algn="ctr"/>
-            <a:endParaRPr lang="en-US" sz="3200" kern="100" dirty="0">
-              <a:solidFill>
-                <a:schemeClr val="tx1"/>
-              </a:solidFill>
-              <a:latin typeface="Source Sans Pro" panose="020B0503030403020204" pitchFamily="34" charset="0"/>
-              <a:ea typeface="Source Sans Pro" panose="020B0503030403020204" pitchFamily="34" charset="0"/>
-              <a:cs typeface="Times New Roman" panose="02020603050405020304" pitchFamily="18" charset="0"/>
-            </a:endParaRPr>
-          </a:p>
-          <a:p>
-            <a:pPr algn="ctr"/>
+              <a:t>, suggesting this uptick is not a market response to AUD rates.</a:t>
+            </a:r>
+          </a:p>
+          <a:p>
+            <a:pPr marL="457200" indent="-457200">
+              <a:buFont typeface="Arial" panose="020B0604020202020204" pitchFamily="34" charset="0"/>
+              <a:buChar char="•"/>
+            </a:pPr>
             <a:r>
               <a:rPr lang="en-US" sz="3200" kern="100" dirty="0">
                 <a:solidFill>
@@ -3999,7 +4167,18 @@
                 <a:ea typeface="Source Sans Pro" panose="020B0503030403020204" pitchFamily="34" charset="0"/>
                 <a:cs typeface="Times New Roman" panose="02020603050405020304" pitchFamily="18" charset="0"/>
               </a:rPr>
-              <a:t>Additional research could reveal more details about this negative AUD relationship, other substances, granularity at the state-level, and treatment quality and accessibility implications for people with SUDs.  </a:t>
+              <a:t>Random effects show </a:t>
+            </a:r>
+            <a:r>
+              <a:rPr lang="en-US" sz="3200" kern="100" dirty="0">
+                <a:solidFill>
+                  <a:schemeClr val="tx1"/>
+                </a:solidFill>
+                <a:latin typeface="Source Sans Pro" panose="020B0503030403020204" pitchFamily="34" charset="0"/>
+                <a:ea typeface="Source Sans Pro" panose="020B0503030403020204" pitchFamily="34" charset="0"/>
+                <a:cs typeface="Times New Roman" panose="02020603050405020304" pitchFamily="18" charset="0"/>
+              </a:rPr>
+              <a:t>surprising variation across states. Notably, California shows a negative random effect although it has been widely criticized for its for-profit  SUD treatment industry</a:t>
             </a:r>
           </a:p>
         </p:txBody>
@@ -4013,7 +4192,7 @@
         <p:spPr>
           <a:xfrm>
             <a:off x="578030" y="11832991"/>
-            <a:ext cx="10346237" cy="9529979"/>
+            <a:ext cx="10055965" cy="9529979"/>
           </a:xfrm>
           <a:prstGeom prst="rect">
             <a:avLst/>
@@ -4081,8 +4260,28 @@
                 <a:ea typeface="Source Sans Pro" panose="020B0503030403020204" pitchFamily="34" charset="0"/>
                 <a:cs typeface="Times New Roman" panose="02020603050405020304" pitchFamily="18" charset="0"/>
               </a:rPr>
-              <a:t>The National Survey on Substance Abuse Treatment Services (NSSATS) surveys treatment centers from all 50 United States and the District of Columbia. </a:t>
-            </a:r>
+              <a:t>The National Survey on Substance Abuse Treatment Services (NSSATS) surveys treatment centers from all 50 United States and the District of Columbia. For-profit treatment center counts ar</a:t>
+            </a:r>
+            <a:r>
+              <a:rPr lang="en-US" sz="3200" kern="100" dirty="0">
+                <a:solidFill>
+                  <a:schemeClr val="tx1"/>
+                </a:solidFill>
+                <a:latin typeface="Source Sans Pro" panose="020B0503030403020204" pitchFamily="34" charset="0"/>
+                <a:ea typeface="Source Sans Pro" panose="020B0503030403020204" pitchFamily="34" charset="0"/>
+                <a:cs typeface="Times New Roman" panose="02020603050405020304" pitchFamily="18" charset="0"/>
+              </a:rPr>
+              <a:t>e increasing fastest.</a:t>
+            </a:r>
+            <a:endParaRPr lang="en-US" sz="3200" kern="100" dirty="0">
+              <a:solidFill>
+                <a:schemeClr val="tx1"/>
+              </a:solidFill>
+              <a:effectLst/>
+              <a:latin typeface="Source Sans Pro" panose="020B0503030403020204" pitchFamily="34" charset="0"/>
+              <a:ea typeface="Source Sans Pro" panose="020B0503030403020204" pitchFamily="34" charset="0"/>
+              <a:cs typeface="Times New Roman" panose="02020603050405020304" pitchFamily="18" charset="0"/>
+            </a:endParaRPr>
           </a:p>
         </p:txBody>
       </p:sp>
@@ -4144,7 +4343,7 @@
         <p:spPr>
           <a:xfrm>
             <a:off x="21912304" y="19370276"/>
-            <a:ext cx="10438380" cy="1077218"/>
+            <a:ext cx="10438380" cy="1569660"/>
           </a:xfrm>
           <a:prstGeom prst="rect">
             <a:avLst/>
@@ -4159,22 +4358,14 @@
           <a:p>
             <a:pPr algn="r"/>
             <a:r>
-              <a:rPr lang="en-US" sz="3200" dirty="0">
+              <a:rPr lang="en-US" sz="2400" dirty="0">
                 <a:latin typeface="Source Sans Pro" panose="020B0503030403020204" pitchFamily="34" charset="0"/>
                 <a:ea typeface="Source Sans Pro" panose="020B0503030403020204" pitchFamily="34" charset="0"/>
                 <a:cs typeface="Open Sans"/>
               </a:rPr>
-              <a:t>Funding provided by the  </a:t>
-            </a:r>
-            <a:r>
-              <a:rPr lang="en-US" sz="3200" dirty="0">
-                <a:effectLst/>
-                <a:latin typeface="Source Sans Pro" panose="020B0503030403020204" pitchFamily="34" charset="0"/>
-                <a:ea typeface="Source Sans Pro" panose="020B0503030403020204" pitchFamily="34" charset="0"/>
-              </a:rPr>
-              <a:t>National Institute on Drug Abuse (NIDA), T32DA01035</a:t>
-            </a:r>
-            <a:endParaRPr lang="en-US" sz="2400" dirty="0">
+              <a:t>The project described was supported by Grant Number T32DA015035 from the National Institute on Drug Abuse. The content is solely the responsibility of the authors and does not necessarily represent the official views of the National Institute on Drug Abuse or the National Institutes of Health.</a:t>
+            </a:r>
+            <a:endParaRPr lang="en-US" sz="1800" dirty="0">
               <a:latin typeface="Source Sans Pro" panose="020B0503030403020204" pitchFamily="34" charset="0"/>
               <a:ea typeface="Source Sans Pro" panose="020B0503030403020204" pitchFamily="34" charset="0"/>
               <a:cs typeface="Open Sans"/>
@@ -4197,14 +4388,14 @@
           <p:nvPr>
             <p:extLst>
               <p:ext uri="{D42A27DB-BD31-4B8C-83A1-F6EECF244321}">
-                <p14:modId xmlns:p14="http://schemas.microsoft.com/office/powerpoint/2010/main" val="877889278"/>
+                <p14:modId xmlns:p14="http://schemas.microsoft.com/office/powerpoint/2010/main" val="3108569275"/>
               </p:ext>
             </p:extLst>
           </p:nvPr>
         </p:nvGraphicFramePr>
         <p:xfrm>
-          <a:off x="11300239" y="17805754"/>
-          <a:ext cx="10346237" cy="3413760"/>
+          <a:off x="10908355" y="17963214"/>
+          <a:ext cx="10745586" cy="3413760"/>
         </p:xfrm>
         <a:graphic>
           <a:graphicData uri="http://schemas.openxmlformats.org/drawingml/2006/table">
@@ -4213,28 +4404,28 @@
                 <a:tableStyleId>{D7AC3CCA-C797-4891-BE02-D94E43425B78}</a:tableStyleId>
               </a:tblPr>
               <a:tblGrid>
-                <a:gridCol w="3461646">
+                <a:gridCol w="3865712">
                   <a:extLst>
                     <a:ext uri="{9D8B030D-6E8A-4147-A177-3AD203B41FA5}">
                       <a16:colId xmlns:a16="http://schemas.microsoft.com/office/drawing/2014/main" val="2557421700"/>
                     </a:ext>
                   </a:extLst>
                 </a:gridCol>
-                <a:gridCol w="2315326">
+                <a:gridCol w="2134242">
                   <a:extLst>
                     <a:ext uri="{9D8B030D-6E8A-4147-A177-3AD203B41FA5}">
                       <a16:colId xmlns:a16="http://schemas.microsoft.com/office/drawing/2014/main" val="838562182"/>
                     </a:ext>
                   </a:extLst>
                 </a:gridCol>
-                <a:gridCol w="2296643">
+                <a:gridCol w="2385290">
                   <a:extLst>
                     <a:ext uri="{9D8B030D-6E8A-4147-A177-3AD203B41FA5}">
                       <a16:colId xmlns:a16="http://schemas.microsoft.com/office/drawing/2014/main" val="185145689"/>
                     </a:ext>
                   </a:extLst>
                 </a:gridCol>
-                <a:gridCol w="2272622">
+                <a:gridCol w="2360342">
                   <a:extLst>
                     <a:ext uri="{9D8B030D-6E8A-4147-A177-3AD203B41FA5}">
                       <a16:colId xmlns:a16="http://schemas.microsoft.com/office/drawing/2014/main" val="3698580149"/>
@@ -4242,7 +4433,7 @@
                   </a:extLst>
                 </a:gridCol>
               </a:tblGrid>
-              <a:tr h="0">
+              <a:tr h="541932">
                 <a:tc gridSpan="4">
                   <a:txBody>
                     <a:bodyPr/>
@@ -4314,7 +4505,7 @@
                   </a:ext>
                 </a:extLst>
               </a:tr>
-              <a:tr h="316807">
+              <a:tr h="541932">
                 <a:tc>
                   <a:txBody>
                     <a:bodyPr/>
@@ -4355,7 +4546,7 @@
                         </a:spcAft>
                       </a:pPr>
                       <a:r>
-                        <a:rPr lang="en-US" sz="3200" kern="100">
+                        <a:rPr lang="en-US" sz="3200" b="1" kern="100" dirty="0">
                           <a:solidFill>
                             <a:schemeClr val="tx1"/>
                           </a:solidFill>
@@ -4363,7 +4554,7 @@
                         </a:rPr>
                         <a:t>Estimate</a:t>
                       </a:r>
-                      <a:endParaRPr lang="en-US" sz="3200" kern="100">
+                      <a:endParaRPr lang="en-US" sz="3200" b="1" kern="100" dirty="0">
                         <a:solidFill>
                           <a:schemeClr val="tx1"/>
                         </a:solidFill>
@@ -4390,7 +4581,7 @@
                         </a:spcAft>
                       </a:pPr>
                       <a:r>
-                        <a:rPr lang="en-US" sz="3200" kern="100" dirty="0">
+                        <a:rPr lang="en-US" sz="3200" b="1" kern="100" dirty="0">
                           <a:solidFill>
                             <a:schemeClr val="tx1"/>
                           </a:solidFill>
@@ -4398,7 +4589,7 @@
                         </a:rPr>
                         <a:t>Std. Error</a:t>
                       </a:r>
-                      <a:endParaRPr lang="en-US" sz="3200" kern="100" dirty="0">
+                      <a:endParaRPr lang="en-US" sz="3200" b="1" kern="100" dirty="0">
                         <a:solidFill>
                           <a:schemeClr val="tx1"/>
                         </a:solidFill>
@@ -4425,7 +4616,7 @@
                         </a:spcAft>
                       </a:pPr>
                       <a:r>
-                        <a:rPr lang="en-US" sz="3200" kern="100">
+                        <a:rPr lang="en-US" sz="3200" b="1" kern="100" dirty="0">
                           <a:solidFill>
                             <a:schemeClr val="tx1"/>
                           </a:solidFill>
@@ -4433,7 +4624,7 @@
                         </a:rPr>
                         <a:t>P. value</a:t>
                       </a:r>
-                      <a:endParaRPr lang="en-US" sz="3200" kern="100">
+                      <a:endParaRPr lang="en-US" sz="3200" b="1" kern="100" dirty="0">
                         <a:solidFill>
                           <a:schemeClr val="tx1"/>
                         </a:solidFill>
@@ -4452,7 +4643,7 @@
                   </a:ext>
                 </a:extLst>
               </a:tr>
-              <a:tr h="316807">
+              <a:tr h="582474">
                 <a:tc>
                   <a:txBody>
                     <a:bodyPr/>
@@ -4467,7 +4658,7 @@
                         </a:spcAft>
                       </a:pPr>
                       <a:r>
-                        <a:rPr lang="en-US" sz="3200" kern="100">
+                        <a:rPr lang="en-US" sz="3200" kern="100" dirty="0">
                           <a:solidFill>
                             <a:schemeClr val="tx1"/>
                           </a:solidFill>
@@ -4475,7 +4666,7 @@
                         </a:rPr>
                         <a:t>Intercept</a:t>
                       </a:r>
-                      <a:endParaRPr lang="en-US" sz="3200" kern="100">
+                      <a:endParaRPr lang="en-US" sz="3200" kern="100" dirty="0">
                         <a:solidFill>
                           <a:schemeClr val="tx1"/>
                         </a:solidFill>
@@ -4486,7 +4677,7 @@
                       </a:endParaRPr>
                     </a:p>
                   </a:txBody>
-                  <a:tcPr marL="68580" marR="68580" marT="0" marB="0"/>
+                  <a:tcPr marL="68580" marR="68580" marT="0" marB="0" anchor="ctr"/>
                 </a:tc>
                 <a:tc>
                   <a:txBody>
@@ -4599,7 +4790,7 @@
                   </a:ext>
                 </a:extLst>
               </a:tr>
-              <a:tr h="633614">
+              <a:tr h="582474">
                 <a:tc>
                   <a:txBody>
                     <a:bodyPr/>
@@ -4620,26 +4811,7 @@
                           </a:solidFill>
                           <a:effectLst/>
                         </a:rPr>
-                        <a:t>Lagged </a:t>
-                      </a:r>
-                    </a:p>
-                    <a:p>
-                      <a:pPr marL="0" marR="0" algn="ctr">
-                        <a:spcBef>
-                          <a:spcPts val="0"/>
-                        </a:spcBef>
-                        <a:spcAft>
-                          <a:spcPts val="0"/>
-                        </a:spcAft>
-                      </a:pPr>
-                      <a:r>
-                        <a:rPr lang="en-US" sz="3200" kern="0" dirty="0">
-                          <a:solidFill>
-                            <a:schemeClr val="tx1"/>
-                          </a:solidFill>
-                          <a:effectLst/>
-                        </a:rPr>
-                        <a:t>Drug Use</a:t>
+                        <a:t>Lagged Drug Use</a:t>
                       </a:r>
                       <a:endParaRPr lang="en-US" sz="3200" kern="100" dirty="0">
                         <a:solidFill>
@@ -4652,7 +4824,7 @@
                       </a:endParaRPr>
                     </a:p>
                   </a:txBody>
-                  <a:tcPr marL="68580" marR="68580" marT="0" marB="0"/>
+                  <a:tcPr marL="68580" marR="68580" marT="0" marB="0" anchor="ctr"/>
                 </a:tc>
                 <a:tc>
                   <a:txBody>
@@ -4765,7 +4937,7 @@
                   </a:ext>
                 </a:extLst>
               </a:tr>
-              <a:tr h="316807">
+              <a:tr h="582474">
                 <a:tc>
                   <a:txBody>
                     <a:bodyPr/>
@@ -4799,7 +4971,7 @@
                       </a:endParaRPr>
                     </a:p>
                   </a:txBody>
-                  <a:tcPr marL="68580" marR="68580" marT="0" marB="0"/>
+                  <a:tcPr marL="68580" marR="68580" marT="0" marB="0" anchor="ctr"/>
                 </a:tc>
                 <a:tc>
                   <a:txBody>
@@ -4912,7 +5084,7 @@
                   </a:ext>
                 </a:extLst>
               </a:tr>
-              <a:tr h="316807">
+              <a:tr h="582474">
                 <a:tc>
                   <a:txBody>
                     <a:bodyPr/>
@@ -4927,13 +5099,13 @@
                         </a:spcAft>
                       </a:pPr>
                       <a:r>
-                        <a:rPr lang="en-US" sz="3200" kern="0" dirty="0" err="1">
+                        <a:rPr lang="en-US" sz="3200" kern="0" dirty="0">
                           <a:solidFill>
                             <a:schemeClr val="tx1"/>
                           </a:solidFill>
                           <a:effectLst/>
                         </a:rPr>
-                        <a:t>pop_millions</a:t>
+                        <a:t>Population (millions)</a:t>
                       </a:r>
                       <a:endParaRPr lang="en-US" sz="3200" kern="100" dirty="0">
                         <a:solidFill>
@@ -4946,7 +5118,7 @@
                       </a:endParaRPr>
                     </a:p>
                   </a:txBody>
-                  <a:tcPr marL="68580" marR="68580" marT="0" marB="0"/>
+                  <a:tcPr marL="68580" marR="68580" marT="0" marB="0" anchor="ctr"/>
                 </a:tc>
                 <a:tc>
                   <a:txBody>
@@ -5063,53 +5235,6 @@
           </a:graphicData>
         </a:graphic>
       </p:graphicFrame>
-      <p:pic>
-        <p:nvPicPr>
-          <p:cNvPr id="1026" name="Picture 2">
-            <a:extLst>
-              <a:ext uri="{FF2B5EF4-FFF2-40B4-BE49-F238E27FC236}">
-                <a16:creationId xmlns:a16="http://schemas.microsoft.com/office/drawing/2014/main" id="{F2BDD0E4-2EC2-6555-1588-FDD1E1F71738}"/>
-              </a:ext>
-            </a:extLst>
-          </p:cNvPr>
-          <p:cNvPicPr>
-            <a:picLocks noChangeAspect="1" noChangeArrowheads="1"/>
-          </p:cNvPicPr>
-          <p:nvPr/>
-        </p:nvPicPr>
-        <p:blipFill>
-          <a:blip r:embed="rId4">
-            <a:extLst>
-              <a:ext uri="{28A0092B-C50C-407E-A947-70E740481C1C}">
-                <a14:useLocalDpi xmlns:a14="http://schemas.microsoft.com/office/drawing/2010/main" val="0"/>
-              </a:ext>
-            </a:extLst>
-          </a:blip>
-          <a:srcRect/>
-          <a:stretch>
-            <a:fillRect/>
-          </a:stretch>
-        </p:blipFill>
-        <p:spPr bwMode="auto">
-          <a:xfrm>
-            <a:off x="26637011" y="-144101"/>
-            <a:ext cx="5558852" cy="3969947"/>
-          </a:xfrm>
-          <a:prstGeom prst="rect">
-            <a:avLst/>
-          </a:prstGeom>
-          <a:noFill/>
-          <a:extLst>
-            <a:ext uri="{909E8E84-426E-40DD-AFC4-6F175D3DCCD1}">
-              <a14:hiddenFill xmlns:a14="http://schemas.microsoft.com/office/drawing/2010/main">
-                <a:solidFill>
-                  <a:srgbClr val="FFFFFF"/>
-                </a:solidFill>
-              </a14:hiddenFill>
-            </a:ext>
-          </a:extLst>
-        </p:spPr>
-      </p:pic>
       <p:sp>
         <p:nvSpPr>
           <p:cNvPr id="22" name="TextBox 21">
@@ -5163,18 +5288,23 @@
           <p:nvPr/>
         </p:nvPicPr>
         <p:blipFill rotWithShape="1">
-          <a:blip r:embed="rId5"/>
+          <a:blip r:embed="rId4"/>
           <a:srcRect r="24693"/>
           <a:stretch/>
         </p:blipFill>
         <p:spPr>
           <a:xfrm>
-            <a:off x="1135055" y="14217473"/>
-            <a:ext cx="8486023" cy="6951430"/>
+            <a:off x="1135055" y="14405159"/>
+            <a:ext cx="8318687" cy="6814355"/>
           </a:xfrm>
           <a:prstGeom prst="rect">
             <a:avLst/>
           </a:prstGeom>
+          <a:ln>
+            <a:solidFill>
+              <a:schemeClr val="tx1"/>
+            </a:solidFill>
+          </a:ln>
         </p:spPr>
       </p:pic>
       <p:pic>
@@ -5192,13 +5322,13 @@
           <p:nvPr/>
         </p:nvPicPr>
         <p:blipFill rotWithShape="1">
-          <a:blip r:embed="rId5"/>
+          <a:blip r:embed="rId4"/>
           <a:srcRect l="82924" t="35584" r="1281" b="41443"/>
           <a:stretch/>
         </p:blipFill>
         <p:spPr>
           <a:xfrm>
-            <a:off x="9156440" y="17462977"/>
+            <a:off x="8824588" y="17799554"/>
             <a:ext cx="1676400" cy="1504152"/>
           </a:xfrm>
           <a:prstGeom prst="rect">
@@ -5225,8 +5355,8 @@
         </p:nvSpPr>
         <p:spPr>
           <a:xfrm>
-            <a:off x="11264792" y="13264570"/>
-            <a:ext cx="10351008" cy="4247942"/>
+            <a:off x="10872908" y="12524364"/>
+            <a:ext cx="10781032" cy="5153258"/>
           </a:xfrm>
           <a:prstGeom prst="rect">
             <a:avLst/>
@@ -5290,6 +5420,14 @@
               </a:rPr>
               <a:t> </a:t>
             </a:r>
+            <a:endParaRPr lang="en-US" sz="3200" kern="100" dirty="0">
+              <a:solidFill>
+                <a:schemeClr val="tx1"/>
+              </a:solidFill>
+              <a:latin typeface="Source Sans Pro" panose="020B0503030403020204" pitchFamily="34" charset="0"/>
+              <a:ea typeface="Source Sans Pro" panose="020B0503030403020204" pitchFamily="34" charset="0"/>
+              <a:cs typeface="Times New Roman" panose="02020603050405020304" pitchFamily="18" charset="0"/>
+            </a:endParaRPr>
           </a:p>
           <a:p>
             <a:pPr marL="0" marR="0">
@@ -5310,7 +5448,29 @@
                 <a:ea typeface="Source Sans Pro" panose="020B0503030403020204" pitchFamily="34" charset="0"/>
                 <a:cs typeface="Times New Roman" panose="02020603050405020304" pitchFamily="18" charset="0"/>
               </a:rPr>
-              <a:t>Treatment demand measures were lagged because administrative barriers prohibit a treatment center from responding to demand in the same year it emerges. </a:t>
+              <a:t>Three negative binomial distributions modeled the relationship between NSDUH substance use prevalence and </a:t>
+            </a:r>
+          </a:p>
+          <a:p>
+            <a:pPr marL="0" marR="0">
+              <a:spcBef>
+                <a:spcPts val="0"/>
+              </a:spcBef>
+              <a:spcAft>
+                <a:spcPts val="0"/>
+              </a:spcAft>
+            </a:pPr>
+            <a:r>
+              <a:rPr lang="en-US" sz="3200" kern="100" dirty="0">
+                <a:solidFill>
+                  <a:schemeClr val="tx1"/>
+                </a:solidFill>
+                <a:effectLst/>
+                <a:latin typeface="Source Sans Pro" panose="020B0503030403020204" pitchFamily="34" charset="0"/>
+                <a:ea typeface="Source Sans Pro" panose="020B0503030403020204" pitchFamily="34" charset="0"/>
+                <a:cs typeface="Times New Roman" panose="02020603050405020304" pitchFamily="18" charset="0"/>
+              </a:rPr>
+              <a:t>1) for-profit, 2) non-profit, and 3) government NSSATS treatment center counts, after controlling for population and with random effects for year and state.</a:t>
             </a:r>
           </a:p>
           <a:p>
@@ -5350,9 +5510,19 @@
                 <a:ea typeface="Source Sans Pro" panose="020B0503030403020204" pitchFamily="34" charset="0"/>
                 <a:cs typeface="Times New Roman" panose="02020603050405020304" pitchFamily="18" charset="0"/>
               </a:rPr>
-              <a:t>Three negative binomial distribution modeled the count of for-profit, non-profit, and government treatment centers, with random effects for state and year.</a:t>
-            </a:r>
-            <a:endParaRPr lang="en-US" sz="4000" kern="100" dirty="0">
+              <a:t>Demand measures were lagged because administrative barriers prohibit a treatment center from responding to demand in the same year it emerges. </a:t>
+            </a:r>
+          </a:p>
+          <a:p>
+            <a:pPr marL="0" marR="0">
+              <a:spcBef>
+                <a:spcPts val="0"/>
+              </a:spcBef>
+              <a:spcAft>
+                <a:spcPts val="0"/>
+              </a:spcAft>
+            </a:pPr>
+            <a:endParaRPr lang="en-US" sz="3200" kern="100" dirty="0">
               <a:solidFill>
                 <a:schemeClr val="tx1"/>
               </a:solidFill>
@@ -5362,71 +5532,27 @@
               <a:cs typeface="Times New Roman" panose="02020603050405020304" pitchFamily="18" charset="0"/>
             </a:endParaRPr>
           </a:p>
-        </p:txBody>
-      </p:sp>
-      <p:pic>
-        <p:nvPicPr>
-          <p:cNvPr id="32" name="Picture 31" descr="A graph with different colored lines&#10;&#10;Description automatically generated">
-            <a:extLst>
-              <a:ext uri="{FF2B5EF4-FFF2-40B4-BE49-F238E27FC236}">
-                <a16:creationId xmlns:a16="http://schemas.microsoft.com/office/drawing/2014/main" id="{A3BD4DFE-7677-BCA4-153F-F2D7205DB81F}"/>
-              </a:ext>
-            </a:extLst>
-          </p:cNvPr>
-          <p:cNvPicPr>
-            <a:picLocks noChangeAspect="1"/>
-          </p:cNvPicPr>
-          <p:nvPr/>
-        </p:nvPicPr>
-        <p:blipFill rotWithShape="1">
-          <a:blip r:embed="rId6"/>
-          <a:srcRect r="28494"/>
-          <a:stretch/>
-        </p:blipFill>
-        <p:spPr>
-          <a:xfrm>
-            <a:off x="12856144" y="7327056"/>
-            <a:ext cx="6335252" cy="5465446"/>
-          </a:xfrm>
-          <a:prstGeom prst="rect">
-            <a:avLst/>
-          </a:prstGeom>
-        </p:spPr>
-      </p:pic>
-      <p:pic>
-        <p:nvPicPr>
-          <p:cNvPr id="33" name="Picture 32" descr="A graph with different colored lines&#10;&#10;Description automatically generated">
-            <a:extLst>
-              <a:ext uri="{FF2B5EF4-FFF2-40B4-BE49-F238E27FC236}">
-                <a16:creationId xmlns:a16="http://schemas.microsoft.com/office/drawing/2014/main" id="{E6F135A4-A9F6-C4F8-79A3-AD75A42ADEE4}"/>
-              </a:ext>
-            </a:extLst>
-          </p:cNvPr>
-          <p:cNvPicPr>
-            <a:picLocks noChangeAspect="1"/>
-          </p:cNvPicPr>
-          <p:nvPr/>
-        </p:nvPicPr>
-        <p:blipFill rotWithShape="1">
-          <a:blip r:embed="rId6"/>
-          <a:srcRect l="70794" t="30447" b="37506"/>
-          <a:stretch/>
-        </p:blipFill>
-        <p:spPr>
-          <a:xfrm>
-            <a:off x="19038306" y="9239489"/>
-            <a:ext cx="2270025" cy="1536568"/>
-          </a:xfrm>
-          <a:prstGeom prst="rect">
-            <a:avLst/>
-          </a:prstGeom>
-          <a:ln>
-            <a:solidFill>
-              <a:schemeClr val="tx1"/>
-            </a:solidFill>
-          </a:ln>
-        </p:spPr>
-      </p:pic>
+          <a:p>
+            <a:pPr marL="0" marR="0">
+              <a:spcBef>
+                <a:spcPts val="0"/>
+              </a:spcBef>
+              <a:spcAft>
+                <a:spcPts val="0"/>
+              </a:spcAft>
+            </a:pPr>
+            <a:endParaRPr lang="en-US" sz="3200" kern="100" dirty="0">
+              <a:solidFill>
+                <a:schemeClr val="tx1"/>
+              </a:solidFill>
+              <a:effectLst/>
+              <a:latin typeface="Source Sans Pro" panose="020B0503030403020204" pitchFamily="34" charset="0"/>
+              <a:ea typeface="Source Sans Pro" panose="020B0503030403020204" pitchFamily="34" charset="0"/>
+              <a:cs typeface="Times New Roman" panose="02020603050405020304" pitchFamily="18" charset="0"/>
+            </a:endParaRPr>
+          </a:p>
+        </p:txBody>
+      </p:sp>
       <p:pic>
         <p:nvPicPr>
           <p:cNvPr id="35" name="Picture 34" descr="A map of the united states&#10;&#10;Description automatically generated">
@@ -5454,7 +5580,7 @@
         </p:blipFill>
         <p:spPr>
           <a:xfrm>
-            <a:off x="30510481" y="8324596"/>
+            <a:off x="30744881" y="8638587"/>
             <a:ext cx="1796854" cy="3194404"/>
           </a:xfrm>
           <a:prstGeom prst="rect">
@@ -5481,8 +5607,8 @@
         </p:nvSpPr>
         <p:spPr>
           <a:xfrm>
-            <a:off x="22690599" y="20634739"/>
-            <a:ext cx="9616735" cy="584775"/>
+            <a:off x="25223343" y="20839876"/>
+            <a:ext cx="7083991" cy="461665"/>
           </a:xfrm>
           <a:prstGeom prst="rect">
             <a:avLst/>
@@ -5497,7 +5623,7 @@
           <a:p>
             <a:pPr algn="r"/>
             <a:r>
-              <a:rPr lang="en-US" sz="3200" u="sng" kern="100" dirty="0">
+              <a:rPr lang="en-US" sz="2400" u="sng" kern="100" dirty="0">
                 <a:solidFill>
                   <a:schemeClr val="accent5"/>
                 </a:solidFill>
@@ -5505,7 +5631,7 @@
                 <a:latin typeface="Source Sans Pro" panose="020B0503030403020204" pitchFamily="34" charset="0"/>
                 <a:ea typeface="Source Sans Pro" panose="020B0503030403020204" pitchFamily="34" charset="0"/>
                 <a:cs typeface="Times New Roman" panose="02020603050405020304" pitchFamily="18" charset="0"/>
-                <a:hlinkClick r:id="rId7">
+                <a:hlinkClick r:id="rId5">
                   <a:extLst>
                     <a:ext uri="{A12FA001-AC4F-418D-AE19-62706E023703}">
                       <ahyp:hlinkClr xmlns:ahyp="http://schemas.microsoft.com/office/drawing/2018/hyperlinkcolor" val="tx"/>
@@ -5515,7 +5641,7 @@
               </a:rPr>
               <a:t>github.com/baileywellen/sud_treatment_profitstatus</a:t>
             </a:r>
-            <a:endParaRPr lang="en-US" sz="3200" kern="100" dirty="0">
+            <a:endParaRPr lang="en-US" sz="2400" kern="100" dirty="0">
               <a:solidFill>
                 <a:schemeClr val="accent5"/>
               </a:solidFill>
@@ -5527,6 +5653,168 @@
           </a:p>
         </p:txBody>
       </p:sp>
+      <p:pic>
+        <p:nvPicPr>
+          <p:cNvPr id="5" name="Picture 2" descr="Washington University in St. Louis ...">
+            <a:extLst>
+              <a:ext uri="{FF2B5EF4-FFF2-40B4-BE49-F238E27FC236}">
+                <a16:creationId xmlns:a16="http://schemas.microsoft.com/office/drawing/2014/main" id="{58333546-2ADE-5D69-E26D-B62A26429041}"/>
+              </a:ext>
+            </a:extLst>
+          </p:cNvPr>
+          <p:cNvPicPr>
+            <a:picLocks noChangeAspect="1" noChangeArrowheads="1"/>
+          </p:cNvPicPr>
+          <p:nvPr/>
+        </p:nvPicPr>
+        <p:blipFill>
+          <a:blip r:embed="rId6">
+            <a:extLst>
+              <a:ext uri="{28A0092B-C50C-407E-A947-70E740481C1C}">
+                <a14:useLocalDpi xmlns:a14="http://schemas.microsoft.com/office/drawing/2010/main" val="0"/>
+              </a:ext>
+            </a:extLst>
+          </a:blip>
+          <a:srcRect/>
+          <a:stretch>
+            <a:fillRect/>
+          </a:stretch>
+        </p:blipFill>
+        <p:spPr bwMode="auto">
+          <a:xfrm>
+            <a:off x="25084982" y="662244"/>
+            <a:ext cx="6924153" cy="1754326"/>
+          </a:xfrm>
+          <a:prstGeom prst="rect">
+            <a:avLst/>
+          </a:prstGeom>
+          <a:noFill/>
+          <a:extLst>
+            <a:ext uri="{909E8E84-426E-40DD-AFC4-6F175D3DCCD1}">
+              <a14:hiddenFill xmlns:a14="http://schemas.microsoft.com/office/drawing/2010/main">
+                <a:solidFill>
+                  <a:srgbClr val="FFFFFF"/>
+                </a:solidFill>
+              </a14:hiddenFill>
+            </a:ext>
+          </a:extLst>
+        </p:spPr>
+      </p:pic>
+      <p:pic>
+        <p:nvPicPr>
+          <p:cNvPr id="1028" name="Picture 4" descr="samhsa logo in png format">
+            <a:extLst>
+              <a:ext uri="{FF2B5EF4-FFF2-40B4-BE49-F238E27FC236}">
+                <a16:creationId xmlns:a16="http://schemas.microsoft.com/office/drawing/2014/main" id="{0F4ACD12-D758-58F9-485C-325893645220}"/>
+              </a:ext>
+            </a:extLst>
+          </p:cNvPr>
+          <p:cNvPicPr>
+            <a:picLocks noChangeAspect="1" noChangeArrowheads="1"/>
+          </p:cNvPicPr>
+          <p:nvPr/>
+        </p:nvPicPr>
+        <p:blipFill>
+          <a:blip r:embed="rId7">
+            <a:extLst>
+              <a:ext uri="{28A0092B-C50C-407E-A947-70E740481C1C}">
+                <a14:useLocalDpi xmlns:a14="http://schemas.microsoft.com/office/drawing/2010/main" val="0"/>
+              </a:ext>
+            </a:extLst>
+          </a:blip>
+          <a:srcRect/>
+          <a:stretch>
+            <a:fillRect/>
+          </a:stretch>
+        </p:blipFill>
+        <p:spPr bwMode="auto">
+          <a:xfrm>
+            <a:off x="7066466" y="9719855"/>
+            <a:ext cx="3508830" cy="2505889"/>
+          </a:xfrm>
+          <a:prstGeom prst="rect">
+            <a:avLst/>
+          </a:prstGeom>
+          <a:noFill/>
+          <a:extLst>
+            <a:ext uri="{909E8E84-426E-40DD-AFC4-6F175D3DCCD1}">
+              <a14:hiddenFill xmlns:a14="http://schemas.microsoft.com/office/drawing/2010/main">
+                <a:solidFill>
+                  <a:srgbClr val="FFFFFF"/>
+                </a:solidFill>
+              </a14:hiddenFill>
+            </a:ext>
+          </a:extLst>
+        </p:spPr>
+      </p:pic>
+      <p:pic>
+        <p:nvPicPr>
+          <p:cNvPr id="18" name="Picture 17" descr="A graph with different colored lines&#10;&#10;Description automatically generated">
+            <a:extLst>
+              <a:ext uri="{FF2B5EF4-FFF2-40B4-BE49-F238E27FC236}">
+                <a16:creationId xmlns:a16="http://schemas.microsoft.com/office/drawing/2014/main" id="{9E0CA371-7648-4767-274F-8DED4F2CA70C}"/>
+              </a:ext>
+            </a:extLst>
+          </p:cNvPr>
+          <p:cNvPicPr>
+            <a:picLocks noChangeAspect="1"/>
+          </p:cNvPicPr>
+          <p:nvPr/>
+        </p:nvPicPr>
+        <p:blipFill rotWithShape="1">
+          <a:blip r:embed="rId8"/>
+          <a:srcRect r="28072"/>
+          <a:stretch/>
+        </p:blipFill>
+        <p:spPr>
+          <a:xfrm>
+            <a:off x="13074026" y="6903168"/>
+            <a:ext cx="6027309" cy="5169252"/>
+          </a:xfrm>
+          <a:prstGeom prst="rect">
+            <a:avLst/>
+          </a:prstGeom>
+          <a:ln>
+            <a:solidFill>
+              <a:schemeClr val="tx1"/>
+            </a:solidFill>
+          </a:ln>
+        </p:spPr>
+      </p:pic>
+      <p:pic>
+        <p:nvPicPr>
+          <p:cNvPr id="19" name="Picture 18" descr="A graph with different colored lines&#10;&#10;Description automatically generated">
+            <a:extLst>
+              <a:ext uri="{FF2B5EF4-FFF2-40B4-BE49-F238E27FC236}">
+                <a16:creationId xmlns:a16="http://schemas.microsoft.com/office/drawing/2014/main" id="{C6E33313-2EFD-69A7-9356-29E601216EFB}"/>
+              </a:ext>
+            </a:extLst>
+          </p:cNvPr>
+          <p:cNvPicPr>
+            <a:picLocks noChangeAspect="1"/>
+          </p:cNvPicPr>
+          <p:nvPr/>
+        </p:nvPicPr>
+        <p:blipFill rotWithShape="1">
+          <a:blip r:embed="rId8"/>
+          <a:srcRect l="71846" t="32207" b="37486"/>
+          <a:stretch/>
+        </p:blipFill>
+        <p:spPr>
+          <a:xfrm>
+            <a:off x="18683010" y="8315105"/>
+            <a:ext cx="2188212" cy="1453128"/>
+          </a:xfrm>
+          <a:prstGeom prst="rect">
+            <a:avLst/>
+          </a:prstGeom>
+          <a:ln>
+            <a:solidFill>
+              <a:schemeClr val="tx1"/>
+            </a:solidFill>
+          </a:ln>
+        </p:spPr>
+      </p:pic>
     </p:spTree>
     <p:extLst>
       <p:ext uri="{BB962C8B-B14F-4D97-AF65-F5344CB8AC3E}">

</xml_diff>